<commit_message>
Read through of the HamSkill project presentation.
</commit_message>
<xml_diff>
--- a/Project/Project_Presentation/Zayd_Hammoudeh_-_HamSkill_Run_Haskell_Anywhere.pptx
+++ b/Project/Project_Presentation/Zayd_Hammoudeh_-_HamSkill_Run_Haskell_Anywhere.pptx
@@ -278,7 +278,7 @@
               <a:pPr>
                 <a:defRPr/>
               </a:pPr>
-              <a:t>4/11/2016</a:t>
+              <a:t>4/16/2016</a:t>
             </a:fld>
             <a:endParaRPr lang="en-US"/>
           </a:p>
@@ -4747,8 +4747,15 @@
               </a:spcAft>
             </a:pPr>
             <a:r>
+              <a:rPr lang="en-US" b="1" dirty="0" smtClean="0">
+                <a:latin typeface="Courier New" panose="02070309020205020404" pitchFamily="49" charset="0"/>
+                <a:cs typeface="Courier New" panose="02070309020205020404" pitchFamily="49" charset="0"/>
+              </a:rPr>
+              <a:t>bash</a:t>
+            </a:r>
+            <a:r>
               <a:rPr lang="en-US" dirty="0" smtClean="0"/>
-              <a:t>bash Script</a:t>
+              <a:t> Script</a:t>
             </a:r>
           </a:p>
           <a:p>
@@ -4782,7 +4789,18 @@
             </a:pPr>
             <a:r>
               <a:rPr lang="en-US" dirty="0" smtClean="0"/>
-              <a:t>To add a new test case, only need to add a single line to the bash file.</a:t>
+              <a:t>To add a new test case, only need to add a single line to the </a:t>
+            </a:r>
+            <a:r>
+              <a:rPr lang="en-US" b="1" dirty="0">
+                <a:latin typeface="Courier New" panose="02070309020205020404" pitchFamily="49" charset="0"/>
+                <a:cs typeface="Courier New" panose="02070309020205020404" pitchFamily="49" charset="0"/>
+              </a:rPr>
+              <a:t>bash</a:t>
+            </a:r>
+            <a:r>
+              <a:rPr lang="en-US" dirty="0" smtClean="0"/>
+              <a:t> file.</a:t>
             </a:r>
           </a:p>
           <a:p>
@@ -6049,13 +6067,8 @@
             </a:pPr>
             <a:r>
               <a:rPr lang="en-US" sz="2800" b="1" dirty="0" smtClean="0"/>
-              <a:t>Two Major </a:t>
-            </a:r>
-            <a:r>
-              <a:rPr lang="en-US" sz="2800" b="1" dirty="0" smtClean="0"/>
-              <a:t>Cross-Platform Paradigms:</a:t>
-            </a:r>
-            <a:endParaRPr lang="en-US" sz="2800" b="1" dirty="0" smtClean="0"/>
+              <a:t>Two Major Cross-Platform Paradigms:</a:t>
+            </a:r>
           </a:p>
           <a:p>
             <a:pPr lvl="1">
@@ -6446,11 +6459,7 @@
             </a:r>
             <a:r>
               <a:rPr lang="en-US" dirty="0" smtClean="0"/>
-              <a:t>: </a:t>
-            </a:r>
-            <a:r>
-              <a:rPr lang="en-US" dirty="0" smtClean="0"/>
-              <a:t>Used to overcome any language/implementation specific differences when running in the JVM.</a:t>
+              <a:t>: Used to overcome any language/implementation specific differences when running in the JVM.</a:t>
             </a:r>
             <a:endParaRPr lang="en-US" b="1" dirty="0" smtClean="0"/>
           </a:p>
@@ -6624,19 +6633,7 @@
             </a:r>
             <a:r>
               <a:rPr lang="en-US" dirty="0" smtClean="0"/>
-              <a:t>– A Java-based LL(*) parser that </a:t>
-            </a:r>
-            <a:r>
-              <a:rPr lang="en-US" dirty="0" smtClean="0"/>
-              <a:t>parses </a:t>
-            </a:r>
-            <a:r>
-              <a:rPr lang="en-US" dirty="0" smtClean="0"/>
-              <a:t>a structured </a:t>
-            </a:r>
-            <a:r>
-              <a:rPr lang="en-US" dirty="0" smtClean="0"/>
-              <a:t>corpus based off a user-defined grammar.  </a:t>
+              <a:t>– A Java-based LL(*) parser that parses a structured corpus based off a user-defined grammar.  </a:t>
             </a:r>
             <a:r>
               <a:rPr lang="en-US" i="1" dirty="0" err="1" smtClean="0"/>
@@ -6644,17 +6641,8 @@
             </a:r>
             <a:r>
               <a:rPr lang="en-US" dirty="0" smtClean="0"/>
-              <a:t> uses </a:t>
-            </a:r>
-            <a:r>
-              <a:rPr lang="en-US" dirty="0" smtClean="0"/>
-              <a:t>two separate </a:t>
-            </a:r>
-            <a:r>
-              <a:rPr lang="en-US" dirty="0" smtClean="0"/>
-              <a:t>grammars, namely:</a:t>
-            </a:r>
-            <a:endParaRPr lang="en-US" dirty="0" smtClean="0"/>
+              <a:t> uses two separate grammars, namely:</a:t>
+            </a:r>
           </a:p>
           <a:p>
             <a:pPr lvl="1">
@@ -6686,11 +6674,11 @@
             </a:r>
             <a:r>
               <a:rPr lang="en-US" dirty="0" smtClean="0"/>
-              <a:t>Instructs ANTLR </a:t>
+              <a:t>Defines how to </a:t>
             </a:r>
             <a:r>
               <a:rPr lang="en-US" dirty="0" smtClean="0"/>
-              <a:t>how to parse Haskell code</a:t>
+              <a:t>parse Haskell code</a:t>
             </a:r>
           </a:p>
           <a:p>
@@ -6711,23 +6699,7 @@
             </a:r>
             <a:r>
               <a:rPr lang="en-US" dirty="0" smtClean="0"/>
-              <a:t> – </a:t>
-            </a:r>
-            <a:r>
-              <a:rPr lang="en-US" dirty="0" smtClean="0"/>
-              <a:t>Defines </a:t>
-            </a:r>
-            <a:r>
-              <a:rPr lang="en-US" dirty="0" smtClean="0"/>
-              <a:t>the </a:t>
-            </a:r>
-            <a:r>
-              <a:rPr lang="en-US" dirty="0" smtClean="0"/>
-              <a:t>differences </a:t>
-            </a:r>
-            <a:r>
-              <a:rPr lang="en-US" dirty="0" smtClean="0"/>
-              <a:t>between </a:t>
+              <a:t> – Defines the differences between </a:t>
             </a:r>
             <a:r>
               <a:rPr lang="en-US" i="1" dirty="0" err="1" smtClean="0"/>
@@ -6743,8 +6715,9 @@
             </a:r>
             <a:r>
               <a:rPr lang="en-US" dirty="0" smtClean="0"/>
-              <a:t>Haskell.</a:t>
-            </a:r>
+              <a:t>Haskell’s output.</a:t>
+            </a:r>
+            <a:endParaRPr lang="en-US" dirty="0" smtClean="0"/>
           </a:p>
           <a:p>
             <a:pPr>
@@ -6780,13 +6753,8 @@
             </a:r>
             <a:r>
               <a:rPr lang="en-US" dirty="0" smtClean="0"/>
-              <a:t> Haskell code to </a:t>
-            </a:r>
-            <a:r>
-              <a:rPr lang="en-US" dirty="0" smtClean="0"/>
-              <a:t>Scala.</a:t>
-            </a:r>
-            <a:endParaRPr lang="en-US" dirty="0" smtClean="0"/>
+              <a:t> Haskell code to Scala.</a:t>
+            </a:r>
           </a:p>
           <a:p>
             <a:pPr>
@@ -6812,11 +6780,7 @@
             </a:r>
             <a:r>
               <a:rPr lang="en-US" dirty="0" smtClean="0"/>
-              <a:t>– JVM-based, functional </a:t>
-            </a:r>
-            <a:r>
-              <a:rPr lang="en-US" dirty="0" smtClean="0"/>
-              <a:t>programming language whose feature set overlaps well with Haskell.</a:t>
+              <a:t>– JVM-based, functional programming language whose feature set overlaps well with Haskell.</a:t>
             </a:r>
           </a:p>
           <a:p>
@@ -7183,7 +7147,23 @@
             </a:r>
             <a:r>
               <a:rPr lang="en-US" dirty="0" smtClean="0"/>
-              <a:t>of Haskell meaning supports only a subset of Haskell’s features (with special formatting).  Haskell features that are supported include:</a:t>
+              <a:t>of Haskell meaning supports only a subset of Haskell’s features (with special formatting).  Haskell features that are </a:t>
+            </a:r>
+            <a:r>
+              <a:rPr lang="en-US" dirty="0" smtClean="0"/>
+              <a:t>supported by </a:t>
+            </a:r>
+            <a:r>
+              <a:rPr lang="en-US" i="1" dirty="0" err="1" smtClean="0"/>
+              <a:t>HamSkill</a:t>
+            </a:r>
+            <a:r>
+              <a:rPr lang="en-US" dirty="0" smtClean="0"/>
+              <a:t> </a:t>
+            </a:r>
+            <a:r>
+              <a:rPr lang="en-US" dirty="0" smtClean="0"/>
+              <a:t>include:</a:t>
             </a:r>
           </a:p>
         </p:txBody>
@@ -7226,14 +7206,14 @@
           <p:nvPr>
             <p:extLst>
               <p:ext uri="{D42A27DB-BD31-4B8C-83A1-F6EECF244321}">
-                <p14:modId xmlns:p14="http://schemas.microsoft.com/office/powerpoint/2010/main" val="367212766"/>
+                <p14:modId xmlns:p14="http://schemas.microsoft.com/office/powerpoint/2010/main" val="2581534796"/>
               </p:ext>
             </p:extLst>
           </p:nvPr>
         </p:nvGraphicFramePr>
         <p:xfrm>
           <a:off x="838195" y="2536824"/>
-          <a:ext cx="7797804" cy="3870960"/>
+          <a:ext cx="7797804" cy="3864102"/>
         </p:xfrm>
         <a:graphic>
           <a:graphicData uri="http://schemas.openxmlformats.org/drawingml/2006/table">
@@ -7295,7 +7275,23 @@
                             <a:schemeClr val="tx1"/>
                           </a:solidFill>
                         </a:rPr>
-                        <a:t> (complicated by Haskell’s lack of obvious argument notation)</a:t>
+                        <a:t> (complicated by Haskell’s lack of </a:t>
+                      </a:r>
+                      <a:r>
+                        <a:rPr lang="en-US" b="0" baseline="0" dirty="0" smtClean="0">
+                          <a:solidFill>
+                            <a:schemeClr val="tx1"/>
+                          </a:solidFill>
+                        </a:rPr>
+                        <a:t>explicit argument </a:t>
+                      </a:r>
+                      <a:r>
+                        <a:rPr lang="en-US" b="0" baseline="0" dirty="0" smtClean="0">
+                          <a:solidFill>
+                            <a:schemeClr val="tx1"/>
+                          </a:solidFill>
+                        </a:rPr>
+                        <a:t>notation)</a:t>
                       </a:r>
                     </a:p>
                     <a:p>
@@ -8075,7 +8071,7 @@
         </p:nvGraphicFramePr>
         <p:xfrm>
           <a:off x="838195" y="2536824"/>
-          <a:ext cx="7797804" cy="3864102"/>
+          <a:ext cx="7797804" cy="3870960"/>
         </p:xfrm>
         <a:graphic>
           <a:graphicData uri="http://schemas.openxmlformats.org/drawingml/2006/table">
@@ -9253,7 +9249,24 @@
                 <a:latin typeface="Courier New" panose="02070309020205020404" pitchFamily="49" charset="0"/>
                 <a:cs typeface="Courier New" panose="02070309020205020404" pitchFamily="49" charset="0"/>
               </a:rPr>
-              <a:t>doubleIncrementMonad(3</a:t>
+              <a:t>doubleIncrementMonad</a:t>
+            </a:r>
+            <a:r>
+              <a:rPr lang="en-US" b="1" dirty="0">
+                <a:latin typeface="Courier New" panose="02070309020205020404" pitchFamily="49" charset="0"/>
+                <a:cs typeface="Courier New" panose="02070309020205020404" pitchFamily="49" charset="0"/>
+              </a:rPr>
+              <a:t>(</a:t>
+            </a:r>
+            <a:r>
+              <a:rPr lang="en-US" b="1" dirty="0">
+                <a:solidFill>
+                  <a:srgbClr val="B71D11"/>
+                </a:solidFill>
+                <a:latin typeface="Courier New" panose="02070309020205020404" pitchFamily="49" charset="0"/>
+                <a:cs typeface="Courier New" panose="02070309020205020404" pitchFamily="49" charset="0"/>
+              </a:rPr>
+              <a:t>3</a:t>
             </a:r>
             <a:r>
               <a:rPr lang="en-US" b="1" dirty="0">

</xml_diff>

<commit_message>
More cleanup of the project slides for the CS252 final project.
</commit_message>
<xml_diff>
--- a/Project/Project_Presentation/Zayd_Hammoudeh_-_HamSkill_Run_Haskell_Anywhere.pptx
+++ b/Project/Project_Presentation/Zayd_Hammoudeh_-_HamSkill_Run_Haskell_Anywhere.pptx
@@ -4599,7 +4599,18 @@
             </a:r>
             <a:r>
               <a:rPr lang="en-US" dirty="0" smtClean="0"/>
-              <a:t> architecture has components written in Java, Haskell, Scala, bash, and ANTLR.  </a:t>
+              <a:t> architecture has components written in Java, Haskell, Scala, </a:t>
+            </a:r>
+            <a:r>
+              <a:rPr lang="en-US" sz="2200" b="1" dirty="0">
+                <a:latin typeface="Courier New" panose="02070309020205020404" pitchFamily="49" charset="0"/>
+                <a:cs typeface="Courier New" panose="02070309020205020404" pitchFamily="49" charset="0"/>
+              </a:rPr>
+              <a:t>bash</a:t>
+            </a:r>
+            <a:r>
+              <a:rPr lang="en-US" dirty="0" smtClean="0"/>
+              <a:t>, and ANTLR.  </a:t>
             </a:r>
           </a:p>
           <a:p>
@@ -5003,7 +5014,15 @@
             </a:pPr>
             <a:r>
               <a:rPr lang="en-US" dirty="0" smtClean="0"/>
-              <a:t>This would eliminate the dependence on the whims of a third party language (Scala)</a:t>
+              <a:t>This would eliminate the dependence on the whims of a </a:t>
+            </a:r>
+            <a:r>
+              <a:rPr lang="en-US" dirty="0" smtClean="0"/>
+              <a:t>third-party, high level language </a:t>
+            </a:r>
+            <a:r>
+              <a:rPr lang="en-US" dirty="0" smtClean="0"/>
+              <a:t>(Scala)</a:t>
             </a:r>
           </a:p>
           <a:p>
@@ -5716,7 +5735,7 @@
             </a:pPr>
             <a:r>
               <a:rPr lang="en-US" sz="1900" dirty="0" smtClean="0"/>
-              <a:t>Scala is a compiled language and has limited support in Java for runtime compilation.  To best handle this limitation, two </a:t>
+              <a:t>Scala is a compiled language and has limited support in Java for runtime compilation.  To best handle this limitation, </a:t>
             </a:r>
             <a:r>
               <a:rPr lang="en-US" sz="1900" i="1" dirty="0" err="1" smtClean="0"/>
@@ -5724,8 +5743,13 @@
             </a:r>
             <a:r>
               <a:rPr lang="en-US" sz="1900" dirty="0" smtClean="0"/>
-              <a:t> run modes were created:</a:t>
-            </a:r>
+              <a:t> has two </a:t>
+            </a:r>
+            <a:r>
+              <a:rPr lang="en-US" sz="1900" smtClean="0"/>
+              <a:t>run modes:</a:t>
+            </a:r>
+            <a:endParaRPr lang="en-US" sz="1900" dirty="0" smtClean="0"/>
           </a:p>
           <a:p>
             <a:pPr>
@@ -6670,15 +6694,7 @@
             </a:r>
             <a:r>
               <a:rPr lang="en-US" dirty="0" smtClean="0"/>
-              <a:t>– </a:t>
-            </a:r>
-            <a:r>
-              <a:rPr lang="en-US" dirty="0" smtClean="0"/>
-              <a:t>Defines how to </a:t>
-            </a:r>
-            <a:r>
-              <a:rPr lang="en-US" dirty="0" smtClean="0"/>
-              <a:t>parse Haskell code</a:t>
+              <a:t>– Defines how to parse Haskell code</a:t>
             </a:r>
           </a:p>
           <a:p>
@@ -6699,7 +6715,11 @@
             </a:r>
             <a:r>
               <a:rPr lang="en-US" dirty="0" smtClean="0"/>
-              <a:t> – Defines the differences between </a:t>
+              <a:t> – </a:t>
+            </a:r>
+            <a:r>
+              <a:rPr lang="en-US" dirty="0" smtClean="0"/>
+              <a:t>Defines how to reformat </a:t>
             </a:r>
             <a:r>
               <a:rPr lang="en-US" i="1" dirty="0" err="1" smtClean="0"/>
@@ -6711,11 +6731,7 @@
             </a:r>
             <a:r>
               <a:rPr lang="en-US" dirty="0" smtClean="0"/>
-              <a:t> unformatted output and </a:t>
-            </a:r>
-            <a:r>
-              <a:rPr lang="en-US" dirty="0" smtClean="0"/>
-              <a:t>Haskell’s output.</a:t>
+              <a:t> default output to match Haskell’s standard output</a:t>
             </a:r>
             <a:endParaRPr lang="en-US" dirty="0" smtClean="0"/>
           </a:p>
@@ -7147,11 +7163,15 @@
             </a:r>
             <a:r>
               <a:rPr lang="en-US" dirty="0" smtClean="0"/>
-              <a:t>of Haskell meaning supports only a subset of Haskell’s features (with special formatting).  Haskell features that are </a:t>
+              <a:t>of Haskell meaning </a:t>
             </a:r>
             <a:r>
               <a:rPr lang="en-US" dirty="0" smtClean="0"/>
-              <a:t>supported by </a:t>
+              <a:t>it supports </a:t>
+            </a:r>
+            <a:r>
+              <a:rPr lang="en-US" dirty="0" smtClean="0"/>
+              <a:t>only a subset of Haskell’s features (with special formatting).  Haskell features that are supported by </a:t>
             </a:r>
             <a:r>
               <a:rPr lang="en-US" i="1" dirty="0" err="1" smtClean="0"/>
@@ -7159,11 +7179,7 @@
             </a:r>
             <a:r>
               <a:rPr lang="en-US" dirty="0" smtClean="0"/>
-              <a:t> </a:t>
-            </a:r>
-            <a:r>
-              <a:rPr lang="en-US" dirty="0" smtClean="0"/>
-              <a:t>include:</a:t>
+              <a:t> include:</a:t>
             </a:r>
           </a:p>
         </p:txBody>
@@ -7213,7 +7229,7 @@
         </p:nvGraphicFramePr>
         <p:xfrm>
           <a:off x="838195" y="2536824"/>
-          <a:ext cx="7797804" cy="3864102"/>
+          <a:ext cx="7797804" cy="3870960"/>
         </p:xfrm>
         <a:graphic>
           <a:graphicData uri="http://schemas.openxmlformats.org/drawingml/2006/table">
@@ -7275,23 +7291,7 @@
                             <a:schemeClr val="tx1"/>
                           </a:solidFill>
                         </a:rPr>
-                        <a:t> (complicated by Haskell’s lack of </a:t>
-                      </a:r>
-                      <a:r>
-                        <a:rPr lang="en-US" b="0" baseline="0" dirty="0" smtClean="0">
-                          <a:solidFill>
-                            <a:schemeClr val="tx1"/>
-                          </a:solidFill>
-                        </a:rPr>
-                        <a:t>explicit argument </a:t>
-                      </a:r>
-                      <a:r>
-                        <a:rPr lang="en-US" b="0" baseline="0" dirty="0" smtClean="0">
-                          <a:solidFill>
-                            <a:schemeClr val="tx1"/>
-                          </a:solidFill>
-                        </a:rPr>
-                        <a:t>notation)</a:t>
+                        <a:t> (complicated by Haskell’s lack of explicit argument notation)</a:t>
                       </a:r>
                     </a:p>
                     <a:p>
@@ -8021,8 +8021,33 @@
             </a:r>
             <a:r>
               <a:rPr lang="en-US" dirty="0" smtClean="0"/>
-              <a:t>of Haskell meaning supports only a subset of Haskell’s features (with special formatting).  Haskell features that are supported include:</a:t>
-            </a:r>
+              <a:t>of Haskell meaning </a:t>
+            </a:r>
+            <a:r>
+              <a:rPr lang="en-US" dirty="0" smtClean="0"/>
+              <a:t>it </a:t>
+            </a:r>
+            <a:r>
+              <a:rPr lang="en-US" dirty="0" smtClean="0"/>
+              <a:t>supports only </a:t>
+            </a:r>
+            <a:r>
+              <a:rPr lang="en-US" dirty="0" smtClean="0"/>
+              <a:t>a subset of Haskell’s features (with special formatting). </a:t>
+            </a:r>
+            <a:r>
+              <a:rPr lang="en-US" dirty="0"/>
+              <a:t>Haskell features that are supported by </a:t>
+            </a:r>
+            <a:r>
+              <a:rPr lang="en-US" i="1" dirty="0" err="1"/>
+              <a:t>HamSkill</a:t>
+            </a:r>
+            <a:r>
+              <a:rPr lang="en-US" dirty="0"/>
+              <a:t> include :</a:t>
+            </a:r>
+            <a:endParaRPr lang="en-US" dirty="0" smtClean="0"/>
           </a:p>
         </p:txBody>
       </p:sp>

</xml_diff>

<commit_message>
Uploading more changes to the CS252 final presentation. Fixing the name of the Disney et al. paper
</commit_message>
<xml_diff>
--- a/Project/Project_Presentation/Zayd_Hammoudeh_-_HamSkill_Run_Haskell_Anywhere.pptx
+++ b/Project/Project_Presentation/Zayd_Hammoudeh_-_HamSkill_Run_Haskell_Anywhere.pptx
@@ -5,10 +5,10 @@
     <p:sldMasterId id="2147483650" r:id="rId1"/>
   </p:sldMasterIdLst>
   <p:notesMasterIdLst>
-    <p:notesMasterId r:id="rId12"/>
+    <p:notesMasterId r:id="rId14"/>
   </p:notesMasterIdLst>
   <p:handoutMasterIdLst>
-    <p:handoutMasterId r:id="rId13"/>
+    <p:handoutMasterId r:id="rId15"/>
   </p:handoutMasterIdLst>
   <p:sldIdLst>
     <p:sldId id="256" r:id="rId2"/>
@@ -21,6 +21,8 @@
     <p:sldId id="328" r:id="rId9"/>
     <p:sldId id="318" r:id="rId10"/>
     <p:sldId id="323" r:id="rId11"/>
+    <p:sldId id="332" r:id="rId12"/>
+    <p:sldId id="333" r:id="rId13"/>
   </p:sldIdLst>
   <p:sldSz cx="9144000" cy="6858000" type="screen4x3"/>
   <p:notesSz cx="6858000" cy="9144000"/>
@@ -1075,6 +1077,157 @@
         </p:txBody>
       </p:sp>
     </p:spTree>
+  </p:cSld>
+  <p:clrMapOvr>
+    <a:masterClrMapping/>
+  </p:clrMapOvr>
+</p:notes>
+</file>
+
+<file path=ppt/notesSlides/notesSlide5.xml><?xml version="1.0" encoding="utf-8"?>
+<p:notes xmlns:a="http://schemas.openxmlformats.org/drawingml/2006/main" xmlns:r="http://schemas.openxmlformats.org/officeDocument/2006/relationships" xmlns:p="http://schemas.openxmlformats.org/presentationml/2006/main">
+  <p:cSld>
+    <p:spTree>
+      <p:nvGrpSpPr>
+        <p:cNvPr id="1" name=""/>
+        <p:cNvGrpSpPr/>
+        <p:nvPr/>
+      </p:nvGrpSpPr>
+      <p:grpSpPr>
+        <a:xfrm>
+          <a:off x="0" y="0"/>
+          <a:ext cx="0" cy="0"/>
+          <a:chOff x="0" y="0"/>
+          <a:chExt cx="0" cy="0"/>
+        </a:xfrm>
+      </p:grpSpPr>
+      <p:sp>
+        <p:nvSpPr>
+          <p:cNvPr id="9217" name="Rectangle 2"/>
+          <p:cNvSpPr>
+            <a:spLocks noGrp="1" noRot="1" noChangeAspect="1" noChangeArrowheads="1" noTextEdit="1"/>
+          </p:cNvSpPr>
+          <p:nvPr>
+            <p:ph type="sldImg"/>
+          </p:nvPr>
+        </p:nvSpPr>
+        <p:spPr>
+          <a:ln/>
+        </p:spPr>
+      </p:sp>
+      <p:sp>
+        <p:nvSpPr>
+          <p:cNvPr id="9218" name="Rectangle 3"/>
+          <p:cNvSpPr>
+            <a:spLocks noGrp="1" noChangeArrowheads="1"/>
+          </p:cNvSpPr>
+          <p:nvPr>
+            <p:ph type="body" idx="1"/>
+          </p:nvPr>
+        </p:nvSpPr>
+        <p:spPr>
+          <a:noFill/>
+          <a:ln/>
+        </p:spPr>
+        <p:txBody>
+          <a:bodyPr/>
+          <a:lstStyle/>
+          <a:p>
+            <a:endParaRPr lang="en-US" smtClean="0"/>
+          </a:p>
+        </p:txBody>
+      </p:sp>
+    </p:spTree>
+  </p:cSld>
+  <p:clrMapOvr>
+    <a:masterClrMapping/>
+  </p:clrMapOvr>
+</p:notes>
+</file>
+
+<file path=ppt/notesSlides/notesSlide6.xml><?xml version="1.0" encoding="utf-8"?>
+<p:notes xmlns:a="http://schemas.openxmlformats.org/drawingml/2006/main" xmlns:r="http://schemas.openxmlformats.org/officeDocument/2006/relationships" xmlns:p="http://schemas.openxmlformats.org/presentationml/2006/main">
+  <p:cSld>
+    <p:spTree>
+      <p:nvGrpSpPr>
+        <p:cNvPr id="1" name=""/>
+        <p:cNvGrpSpPr/>
+        <p:nvPr/>
+      </p:nvGrpSpPr>
+      <p:grpSpPr>
+        <a:xfrm>
+          <a:off x="0" y="0"/>
+          <a:ext cx="0" cy="0"/>
+          <a:chOff x="0" y="0"/>
+          <a:chExt cx="0" cy="0"/>
+        </a:xfrm>
+      </p:grpSpPr>
+      <p:sp>
+        <p:nvSpPr>
+          <p:cNvPr id="2" name="Slide Image Placeholder 1"/>
+          <p:cNvSpPr>
+            <a:spLocks noGrp="1" noRot="1" noChangeAspect="1"/>
+          </p:cNvSpPr>
+          <p:nvPr>
+            <p:ph type="sldImg"/>
+          </p:nvPr>
+        </p:nvSpPr>
+        <p:spPr/>
+      </p:sp>
+      <p:sp>
+        <p:nvSpPr>
+          <p:cNvPr id="3" name="Notes Placeholder 2"/>
+          <p:cNvSpPr>
+            <a:spLocks noGrp="1"/>
+          </p:cNvSpPr>
+          <p:nvPr>
+            <p:ph type="body" idx="1"/>
+          </p:nvPr>
+        </p:nvSpPr>
+        <p:spPr/>
+        <p:txBody>
+          <a:bodyPr/>
+          <a:lstStyle/>
+          <a:p>
+            <a:endParaRPr lang="en-US" dirty="0"/>
+          </a:p>
+        </p:txBody>
+      </p:sp>
+      <p:sp>
+        <p:nvSpPr>
+          <p:cNvPr id="4" name="Slide Number Placeholder 3"/>
+          <p:cNvSpPr>
+            <a:spLocks noGrp="1"/>
+          </p:cNvSpPr>
+          <p:nvPr>
+            <p:ph type="sldNum" sz="quarter" idx="10"/>
+          </p:nvPr>
+        </p:nvSpPr>
+        <p:spPr/>
+        <p:txBody>
+          <a:bodyPr/>
+          <a:lstStyle/>
+          <a:p>
+            <a:pPr>
+              <a:defRPr/>
+            </a:pPr>
+            <a:fld id="{4FD3D612-DC36-4F3B-B5D9-541A91DFC719}" type="slidenum">
+              <a:rPr lang="en-US" smtClean="0"/>
+              <a:pPr>
+                <a:defRPr/>
+              </a:pPr>
+              <a:t>12</a:t>
+            </a:fld>
+            <a:endParaRPr lang="en-US"/>
+          </a:p>
+        </p:txBody>
+      </p:sp>
+    </p:spTree>
+    <p:extLst>
+      <p:ext uri="{BB962C8B-B14F-4D97-AF65-F5344CB8AC3E}">
+        <p14:creationId xmlns:p14="http://schemas.microsoft.com/office/powerpoint/2010/main" val="1388665042"/>
+      </p:ext>
+    </p:extLst>
   </p:cSld>
   <p:clrMapOvr>
     <a:masterClrMapping/>
@@ -2971,6 +3124,514 @@
 </p:sld>
 </file>
 
+<file path=ppt/slides/slide11.xml><?xml version="1.0" encoding="utf-8"?>
+<p:sld xmlns:a="http://schemas.openxmlformats.org/drawingml/2006/main" xmlns:r="http://schemas.openxmlformats.org/officeDocument/2006/relationships" xmlns:p="http://schemas.openxmlformats.org/presentationml/2006/main">
+  <p:cSld>
+    <p:spTree>
+      <p:nvGrpSpPr>
+        <p:cNvPr id="1" name=""/>
+        <p:cNvGrpSpPr/>
+        <p:nvPr/>
+      </p:nvGrpSpPr>
+      <p:grpSpPr>
+        <a:xfrm>
+          <a:off x="0" y="0"/>
+          <a:ext cx="0" cy="0"/>
+          <a:chOff x="0" y="0"/>
+          <a:chExt cx="0" cy="0"/>
+        </a:xfrm>
+      </p:grpSpPr>
+      <p:sp>
+        <p:nvSpPr>
+          <p:cNvPr id="8193" name="Slide Number Placeholder 5"/>
+          <p:cNvSpPr>
+            <a:spLocks noGrp="1"/>
+          </p:cNvSpPr>
+          <p:nvPr>
+            <p:ph type="sldNum" sz="quarter" idx="12"/>
+          </p:nvPr>
+        </p:nvSpPr>
+        <p:spPr bwMode="auto">
+          <a:noFill/>
+          <a:ln>
+            <a:miter lim="800000"/>
+            <a:headEnd/>
+            <a:tailEnd/>
+          </a:ln>
+        </p:spPr>
+        <p:txBody>
+          <a:bodyPr/>
+          <a:lstStyle/>
+          <a:p>
+            <a:fld id="{24B801EF-5719-45A9-ADAE-91B392020DF8}" type="slidenum">
+              <a:rPr lang="en-US" smtClean="0"/>
+              <a:pPr/>
+              <a:t>11</a:t>
+            </a:fld>
+            <a:endParaRPr lang="en-US" smtClean="0"/>
+          </a:p>
+        </p:txBody>
+      </p:sp>
+      <p:sp>
+        <p:nvSpPr>
+          <p:cNvPr id="8194" name="Rectangle 4"/>
+          <p:cNvSpPr>
+            <a:spLocks/>
+          </p:cNvSpPr>
+          <p:nvPr/>
+        </p:nvSpPr>
+        <p:spPr bwMode="auto">
+          <a:xfrm>
+            <a:off x="822325" y="4544295"/>
+            <a:ext cx="7826375" cy="1976581"/>
+          </a:xfrm>
+          <a:prstGeom prst="rect">
+            <a:avLst/>
+          </a:prstGeom>
+          <a:noFill/>
+          <a:ln w="9525">
+            <a:noFill/>
+            <a:miter lim="800000"/>
+            <a:headEnd/>
+            <a:tailEnd/>
+          </a:ln>
+        </p:spPr>
+        <p:txBody>
+          <a:bodyPr anchor="ctr"/>
+          <a:lstStyle/>
+          <a:p>
+            <a:pPr algn="ctr"/>
+            <a:r>
+              <a:rPr lang="en-US" sz="6000" dirty="0" smtClean="0">
+                <a:solidFill>
+                  <a:srgbClr val="0165BF"/>
+                </a:solidFill>
+                <a:latin typeface="Palatino Linotype" pitchFamily="18" charset="0"/>
+                <a:cs typeface="Times New Roman" pitchFamily="18" charset="0"/>
+              </a:rPr>
+              <a:t>Appendix</a:t>
+            </a:r>
+            <a:endParaRPr lang="en-US" sz="6000" dirty="0" smtClean="0">
+              <a:solidFill>
+                <a:srgbClr val="0165BF"/>
+              </a:solidFill>
+              <a:latin typeface="Palatino Linotype" pitchFamily="18" charset="0"/>
+              <a:cs typeface="Times New Roman" pitchFamily="18" charset="0"/>
+            </a:endParaRPr>
+          </a:p>
+        </p:txBody>
+      </p:sp>
+    </p:spTree>
+    <p:extLst>
+      <p:ext uri="{BB962C8B-B14F-4D97-AF65-F5344CB8AC3E}">
+        <p14:creationId xmlns:p14="http://schemas.microsoft.com/office/powerpoint/2010/main" val="1005067114"/>
+      </p:ext>
+    </p:extLst>
+  </p:cSld>
+  <p:clrMapOvr>
+    <a:masterClrMapping/>
+  </p:clrMapOvr>
+  <p:transition spd="slow"/>
+  <p:timing>
+    <p:tnLst>
+      <p:par>
+        <p:cTn id="1" dur="indefinite" restart="never" nodeType="tmRoot"/>
+      </p:par>
+    </p:tnLst>
+  </p:timing>
+</p:sld>
+</file>
+
+<file path=ppt/slides/slide12.xml><?xml version="1.0" encoding="utf-8"?>
+<p:sld xmlns:a="http://schemas.openxmlformats.org/drawingml/2006/main" xmlns:r="http://schemas.openxmlformats.org/officeDocument/2006/relationships" xmlns:p="http://schemas.openxmlformats.org/presentationml/2006/main">
+  <p:cSld>
+    <p:spTree>
+      <p:nvGrpSpPr>
+        <p:cNvPr id="1" name=""/>
+        <p:cNvGrpSpPr/>
+        <p:nvPr/>
+      </p:nvGrpSpPr>
+      <p:grpSpPr>
+        <a:xfrm>
+          <a:off x="0" y="0"/>
+          <a:ext cx="0" cy="0"/>
+          <a:chOff x="0" y="0"/>
+          <a:chExt cx="0" cy="0"/>
+        </a:xfrm>
+      </p:grpSpPr>
+      <p:sp>
+        <p:nvSpPr>
+          <p:cNvPr id="2" name="Title 1"/>
+          <p:cNvSpPr>
+            <a:spLocks noGrp="1"/>
+          </p:cNvSpPr>
+          <p:nvPr>
+            <p:ph type="title"/>
+          </p:nvPr>
+        </p:nvSpPr>
+        <p:spPr/>
+        <p:txBody>
+          <a:bodyPr>
+            <a:normAutofit fontScale="90000"/>
+          </a:bodyPr>
+          <a:lstStyle/>
+          <a:p>
+            <a:r>
+              <a:rPr lang="en-US" dirty="0" smtClean="0"/>
+              <a:t>Testing Strategy and Architecture</a:t>
+            </a:r>
+            <a:endParaRPr lang="en-US" dirty="0"/>
+          </a:p>
+        </p:txBody>
+      </p:sp>
+      <p:sp>
+        <p:nvSpPr>
+          <p:cNvPr id="3" name="Content Placeholder 2"/>
+          <p:cNvSpPr>
+            <a:spLocks noGrp="1"/>
+          </p:cNvSpPr>
+          <p:nvPr>
+            <p:ph idx="1"/>
+          </p:nvPr>
+        </p:nvSpPr>
+        <p:spPr>
+          <a:xfrm>
+            <a:off x="676274" y="989012"/>
+            <a:ext cx="7829551" cy="5392737"/>
+          </a:xfrm>
+        </p:spPr>
+        <p:txBody>
+          <a:bodyPr>
+            <a:normAutofit fontScale="77500" lnSpcReduction="20000"/>
+          </a:bodyPr>
+          <a:lstStyle/>
+          <a:p>
+            <a:pPr>
+              <a:lnSpc>
+                <a:spcPct val="134000"/>
+              </a:lnSpc>
+              <a:spcBef>
+                <a:spcPts val="0"/>
+              </a:spcBef>
+              <a:spcAft>
+                <a:spcPts val="600"/>
+              </a:spcAft>
+            </a:pPr>
+            <a:r>
+              <a:rPr lang="en-US" i="1" dirty="0" err="1" smtClean="0"/>
+              <a:t>HamSkill</a:t>
+            </a:r>
+            <a:r>
+              <a:rPr lang="en-US" dirty="0" err="1" smtClean="0"/>
+              <a:t>’s</a:t>
+            </a:r>
+            <a:r>
+              <a:rPr lang="en-US" dirty="0" smtClean="0"/>
+              <a:t> architecture has components written in Java, Haskell, Scala, </a:t>
+            </a:r>
+            <a:r>
+              <a:rPr lang="en-US" sz="2200" b="1" dirty="0">
+                <a:latin typeface="Courier New" panose="02070309020205020404" pitchFamily="49" charset="0"/>
+                <a:cs typeface="Courier New" panose="02070309020205020404" pitchFamily="49" charset="0"/>
+              </a:rPr>
+              <a:t>bash</a:t>
+            </a:r>
+            <a:r>
+              <a:rPr lang="en-US" dirty="0" smtClean="0"/>
+              <a:t>, and ANTLR.  </a:t>
+            </a:r>
+          </a:p>
+          <a:p>
+            <a:pPr lvl="1">
+              <a:lnSpc>
+                <a:spcPct val="134000"/>
+              </a:lnSpc>
+              <a:spcBef>
+                <a:spcPts val="0"/>
+              </a:spcBef>
+              <a:spcAft>
+                <a:spcPts val="600"/>
+              </a:spcAft>
+            </a:pPr>
+            <a:r>
+              <a:rPr lang="en-US" dirty="0" smtClean="0"/>
+              <a:t>These heterogeneous components complicate testing.</a:t>
+            </a:r>
+          </a:p>
+          <a:p>
+            <a:pPr lvl="1">
+              <a:lnSpc>
+                <a:spcPct val="134000"/>
+              </a:lnSpc>
+              <a:spcBef>
+                <a:spcPts val="0"/>
+              </a:spcBef>
+              <a:spcAft>
+                <a:spcPts val="600"/>
+              </a:spcAft>
+            </a:pPr>
+            <a:endParaRPr lang="en-US" sz="1500" dirty="0"/>
+          </a:p>
+          <a:p>
+            <a:pPr>
+              <a:lnSpc>
+                <a:spcPct val="134000"/>
+              </a:lnSpc>
+              <a:spcBef>
+                <a:spcPts val="0"/>
+              </a:spcBef>
+              <a:spcAft>
+                <a:spcPts val="600"/>
+              </a:spcAft>
+            </a:pPr>
+            <a:r>
+              <a:rPr lang="en-US" b="1" dirty="0">
+                <a:solidFill>
+                  <a:srgbClr val="0165BF"/>
+                </a:solidFill>
+              </a:rPr>
+              <a:t>Solution: </a:t>
+            </a:r>
+            <a:r>
+              <a:rPr lang="en-US" dirty="0" smtClean="0"/>
+              <a:t>Perform </a:t>
+            </a:r>
+            <a:r>
+              <a:rPr lang="en-US" b="1" i="1" dirty="0" smtClean="0"/>
+              <a:t>black-box system-level </a:t>
+            </a:r>
+            <a:r>
+              <a:rPr lang="en-US" dirty="0" smtClean="0"/>
+              <a:t>testing where code is run in Haskell and </a:t>
+            </a:r>
+            <a:r>
+              <a:rPr lang="en-US" i="1" dirty="0" err="1" smtClean="0"/>
+              <a:t>HamSkill</a:t>
+            </a:r>
+            <a:r>
+              <a:rPr lang="en-US" dirty="0" smtClean="0"/>
+              <a:t> and the outputs compared.</a:t>
+            </a:r>
+          </a:p>
+          <a:p>
+            <a:pPr lvl="1">
+              <a:lnSpc>
+                <a:spcPct val="134000"/>
+              </a:lnSpc>
+              <a:spcBef>
+                <a:spcPts val="0"/>
+              </a:spcBef>
+              <a:spcAft>
+                <a:spcPts val="600"/>
+              </a:spcAft>
+            </a:pPr>
+            <a:r>
+              <a:rPr lang="en-US" b="1" dirty="0" smtClean="0">
+                <a:solidFill>
+                  <a:srgbClr val="008000"/>
+                </a:solidFill>
+              </a:rPr>
+              <a:t>Key Requirement</a:t>
+            </a:r>
+            <a:r>
+              <a:rPr lang="en-US" dirty="0" smtClean="0"/>
+              <a:t>: Make testing as easy and painless as possible.</a:t>
+            </a:r>
+          </a:p>
+          <a:p>
+            <a:pPr lvl="1">
+              <a:lnSpc>
+                <a:spcPct val="134000"/>
+              </a:lnSpc>
+              <a:spcBef>
+                <a:spcPts val="0"/>
+              </a:spcBef>
+              <a:spcAft>
+                <a:spcPts val="600"/>
+              </a:spcAft>
+            </a:pPr>
+            <a:endParaRPr lang="en-US" sz="1500" dirty="0"/>
+          </a:p>
+          <a:p>
+            <a:pPr>
+              <a:lnSpc>
+                <a:spcPct val="134000"/>
+              </a:lnSpc>
+              <a:spcBef>
+                <a:spcPts val="0"/>
+              </a:spcBef>
+              <a:spcAft>
+                <a:spcPts val="600"/>
+              </a:spcAft>
+            </a:pPr>
+            <a:r>
+              <a:rPr lang="en-US" b="1" dirty="0">
+                <a:solidFill>
+                  <a:srgbClr val="0165BF"/>
+                </a:solidFill>
+              </a:rPr>
+              <a:t>Test Architecture:</a:t>
+            </a:r>
+          </a:p>
+          <a:p>
+            <a:pPr lvl="1">
+              <a:lnSpc>
+                <a:spcPct val="134000"/>
+              </a:lnSpc>
+              <a:spcBef>
+                <a:spcPts val="0"/>
+              </a:spcBef>
+              <a:spcAft>
+                <a:spcPts val="600"/>
+              </a:spcAft>
+            </a:pPr>
+            <a:r>
+              <a:rPr lang="en-US" b="1" dirty="0" smtClean="0">
+                <a:latin typeface="Courier New" panose="02070309020205020404" pitchFamily="49" charset="0"/>
+                <a:cs typeface="Courier New" panose="02070309020205020404" pitchFamily="49" charset="0"/>
+              </a:rPr>
+              <a:t>bash</a:t>
+            </a:r>
+            <a:r>
+              <a:rPr lang="en-US" dirty="0" smtClean="0"/>
+              <a:t> Script</a:t>
+            </a:r>
+          </a:p>
+          <a:p>
+            <a:pPr lvl="1">
+              <a:lnSpc>
+                <a:spcPct val="134000"/>
+              </a:lnSpc>
+              <a:spcBef>
+                <a:spcPts val="0"/>
+              </a:spcBef>
+              <a:spcAft>
+                <a:spcPts val="600"/>
+              </a:spcAft>
+            </a:pPr>
+            <a:r>
+              <a:rPr lang="en-US" dirty="0" smtClean="0"/>
+              <a:t>Each test case is a single Haskell program.</a:t>
+            </a:r>
+          </a:p>
+          <a:p>
+            <a:pPr lvl="1">
+              <a:lnSpc>
+                <a:spcPct val="134000"/>
+              </a:lnSpc>
+              <a:spcBef>
+                <a:spcPts val="0"/>
+              </a:spcBef>
+              <a:spcAft>
+                <a:spcPts val="600"/>
+              </a:spcAft>
+            </a:pPr>
+            <a:r>
+              <a:rPr lang="en-US" dirty="0" smtClean="0"/>
+              <a:t>To add a new test case, only need to add a single line to the </a:t>
+            </a:r>
+            <a:r>
+              <a:rPr lang="en-US" b="1" dirty="0">
+                <a:latin typeface="Courier New" panose="02070309020205020404" pitchFamily="49" charset="0"/>
+                <a:cs typeface="Courier New" panose="02070309020205020404" pitchFamily="49" charset="0"/>
+              </a:rPr>
+              <a:t>bash</a:t>
+            </a:r>
+            <a:r>
+              <a:rPr lang="en-US" dirty="0" smtClean="0"/>
+              <a:t> file.</a:t>
+            </a:r>
+          </a:p>
+          <a:p>
+            <a:pPr lvl="1">
+              <a:lnSpc>
+                <a:spcPct val="134000"/>
+              </a:lnSpc>
+              <a:spcBef>
+                <a:spcPts val="0"/>
+              </a:spcBef>
+              <a:spcAft>
+                <a:spcPts val="600"/>
+              </a:spcAft>
+            </a:pPr>
+            <a:endParaRPr lang="en-US" sz="1500" dirty="0"/>
+          </a:p>
+          <a:p>
+            <a:pPr>
+              <a:lnSpc>
+                <a:spcPct val="134000"/>
+              </a:lnSpc>
+              <a:spcBef>
+                <a:spcPts val="0"/>
+              </a:spcBef>
+              <a:spcAft>
+                <a:spcPts val="600"/>
+              </a:spcAft>
+            </a:pPr>
+            <a:r>
+              <a:rPr lang="en-US" dirty="0" smtClean="0"/>
+              <a:t>As each major feature is added, rerun the entire test bench as a means of </a:t>
+            </a:r>
+            <a:r>
+              <a:rPr lang="en-US" b="1" i="1" dirty="0" smtClean="0"/>
+              <a:t>regression testing</a:t>
+            </a:r>
+            <a:r>
+              <a:rPr lang="en-US" dirty="0" smtClean="0"/>
+              <a:t>.</a:t>
+            </a:r>
+          </a:p>
+        </p:txBody>
+      </p:sp>
+      <p:sp>
+        <p:nvSpPr>
+          <p:cNvPr id="4" name="Slide Number Placeholder 3"/>
+          <p:cNvSpPr>
+            <a:spLocks noGrp="1"/>
+          </p:cNvSpPr>
+          <p:nvPr>
+            <p:ph type="sldNum" sz="quarter" idx="11"/>
+          </p:nvPr>
+        </p:nvSpPr>
+        <p:spPr/>
+        <p:txBody>
+          <a:bodyPr/>
+          <a:lstStyle/>
+          <a:p>
+            <a:pPr>
+              <a:defRPr/>
+            </a:pPr>
+            <a:fld id="{325C3FDD-057D-474A-9872-6BB25CD8D5F2}" type="slidenum">
+              <a:rPr lang="en-US" smtClean="0"/>
+              <a:pPr>
+                <a:defRPr/>
+              </a:pPr>
+              <a:t>12</a:t>
+            </a:fld>
+            <a:endParaRPr lang="en-US"/>
+          </a:p>
+        </p:txBody>
+      </p:sp>
+    </p:spTree>
+    <p:extLst>
+      <p:ext uri="{BB962C8B-B14F-4D97-AF65-F5344CB8AC3E}">
+        <p14:creationId xmlns:p14="http://schemas.microsoft.com/office/powerpoint/2010/main" val="3429997125"/>
+      </p:ext>
+    </p:extLst>
+  </p:cSld>
+  <p:clrMapOvr>
+    <a:masterClrMapping/>
+  </p:clrMapOvr>
+  <p:timing>
+    <p:tnLst>
+      <p:par>
+        <p:cTn id="1" dur="indefinite" restart="never" nodeType="tmRoot"/>
+      </p:par>
+    </p:tnLst>
+  </p:timing>
+</p:sld>
+</file>
+
 <file path=ppt/slides/slide2.xml><?xml version="1.0" encoding="utf-8"?>
 <p:sld xmlns:a="http://schemas.openxmlformats.org/drawingml/2006/main" xmlns:r="http://schemas.openxmlformats.org/officeDocument/2006/relationships" xmlns:p="http://schemas.openxmlformats.org/presentationml/2006/main">
   <p:cSld>
@@ -4705,7 +5366,12 @@
             <p:ph type="title"/>
           </p:nvPr>
         </p:nvSpPr>
-        <p:spPr/>
+        <p:spPr>
+          <a:xfrm>
+            <a:off x="2162175" y="113144"/>
+            <a:ext cx="6838950" cy="550863"/>
+          </a:xfrm>
+        </p:spPr>
         <p:txBody>
           <a:bodyPr>
             <a:noAutofit/>

</xml_diff>

<commit_message>
Uploading modifications to the project presentation to fit it better in 8 minutes and to make it better fit the points I intend to discuss.
</commit_message>
<xml_diff>
--- a/Project/Project_Presentation/Zayd_Hammoudeh_-_HamSkill_Run_Haskell_Anywhere.pptx
+++ b/Project/Project_Presentation/Zayd_Hammoudeh_-_HamSkill_Run_Haskell_Anywhere.pptx
@@ -14,8 +14,8 @@
     <p:sldId id="256" r:id="rId2"/>
     <p:sldId id="264" r:id="rId3"/>
     <p:sldId id="314" r:id="rId4"/>
-    <p:sldId id="319" r:id="rId5"/>
-    <p:sldId id="316" r:id="rId6"/>
+    <p:sldId id="316" r:id="rId5"/>
+    <p:sldId id="319" r:id="rId6"/>
     <p:sldId id="327" r:id="rId7"/>
     <p:sldId id="330" r:id="rId8"/>
     <p:sldId id="328" r:id="rId9"/>
@@ -1133,7 +1133,7 @@
           <a:bodyPr/>
           <a:lstStyle/>
           <a:p>
-            <a:endParaRPr lang="en-US" smtClean="0"/>
+            <a:endParaRPr lang="en-US" dirty="0" smtClean="0"/>
           </a:p>
         </p:txBody>
       </p:sp>
@@ -3355,8 +3355,9 @@
             </a:pPr>
             <a:r>
               <a:rPr lang="en-US" dirty="0" smtClean="0"/>
-              <a:t>These heterogeneous components complicate testing.</a:t>
-            </a:r>
+              <a:t>The heterogeneous components complicate testing.</a:t>
+            </a:r>
+            <a:endParaRPr lang="en-US" dirty="0" smtClean="0"/>
           </a:p>
           <a:p>
             <a:pPr lvl="1">
@@ -3777,7 +3778,7 @@
             </a:r>
             <a:r>
               <a:rPr lang="en-US" sz="2400" dirty="0" smtClean="0"/>
-              <a:t>++</a:t>
+              <a:t>++, Haskell</a:t>
             </a:r>
           </a:p>
           <a:p>
@@ -3851,11 +3852,11 @@
             </a:r>
             <a:r>
               <a:rPr lang="en-US" sz="2400" dirty="0" smtClean="0"/>
-              <a:t> Java </a:t>
+              <a:t> </a:t>
             </a:r>
             <a:r>
               <a:rPr lang="en-US" sz="2400" dirty="0" smtClean="0"/>
-              <a:t>JavaScript</a:t>
+              <a:t>Java, JavaScript</a:t>
             </a:r>
             <a:r>
               <a:rPr lang="en-US" sz="2400" dirty="0" smtClean="0"/>
@@ -3941,7 +3942,31 @@
             </a:r>
             <a:r>
               <a:rPr lang="en-US" sz="2800" dirty="0" smtClean="0"/>
-              <a:t>, an architecture to run Haskell programs inside the JVM.</a:t>
+              <a:t>, </a:t>
+            </a:r>
+            <a:r>
+              <a:rPr lang="en-US" sz="2800" dirty="0" smtClean="0"/>
+              <a:t>a </a:t>
+            </a:r>
+            <a:r>
+              <a:rPr lang="en-US" sz="2800" dirty="0" err="1" smtClean="0"/>
+              <a:t>transpiler</a:t>
+            </a:r>
+            <a:r>
+              <a:rPr lang="en-US" sz="2800" dirty="0" smtClean="0"/>
+              <a:t> architecture that allows Haskell </a:t>
+            </a:r>
+            <a:r>
+              <a:rPr lang="en-US" sz="2800" dirty="0" smtClean="0"/>
+              <a:t>programs </a:t>
+            </a:r>
+            <a:r>
+              <a:rPr lang="en-US" sz="2800" dirty="0" smtClean="0"/>
+              <a:t>to run inside </a:t>
+            </a:r>
+            <a:r>
+              <a:rPr lang="en-US" sz="2800" dirty="0" smtClean="0"/>
+              <a:t>the JVM.</a:t>
             </a:r>
           </a:p>
         </p:txBody>
@@ -4234,13 +4259,263 @@
           <a:lstStyle/>
           <a:p>
             <a:r>
+              <a:rPr lang="en-US" sz="3000" dirty="0" smtClean="0"/>
+              <a:t>Key </a:t>
+            </a:r>
+            <a:r>
+              <a:rPr lang="en-US" sz="3000" i="1" dirty="0" err="1" smtClean="0"/>
+              <a:t>HamSkill</a:t>
+            </a:r>
+            <a:r>
+              <a:rPr lang="en-US" sz="3000" dirty="0" smtClean="0"/>
+              <a:t> Architecture Components</a:t>
+            </a:r>
+            <a:endParaRPr lang="en-US" sz="3000" dirty="0"/>
+          </a:p>
+        </p:txBody>
+      </p:sp>
+      <p:sp>
+        <p:nvSpPr>
+          <p:cNvPr id="3" name="Content Placeholder 2"/>
+          <p:cNvSpPr>
+            <a:spLocks noGrp="1"/>
+          </p:cNvSpPr>
+          <p:nvPr>
+            <p:ph idx="1"/>
+          </p:nvPr>
+        </p:nvSpPr>
+        <p:spPr>
+          <a:xfrm>
+            <a:off x="457200" y="989012"/>
+            <a:ext cx="8229600" cy="5267007"/>
+          </a:xfrm>
+        </p:spPr>
+        <p:txBody>
+          <a:bodyPr>
+            <a:normAutofit fontScale="77500" lnSpcReduction="20000"/>
+          </a:bodyPr>
+          <a:lstStyle/>
+          <a:p>
+            <a:pPr>
+              <a:lnSpc>
+                <a:spcPct val="140000"/>
+              </a:lnSpc>
+            </a:pPr>
+            <a:r>
+              <a:rPr lang="en-US" b="1" dirty="0" smtClean="0">
+                <a:solidFill>
+                  <a:srgbClr val="070BB9"/>
+                </a:solidFill>
+              </a:rPr>
+              <a:t>ANTLR</a:t>
+            </a:r>
+            <a:r>
+              <a:rPr lang="en-US" dirty="0" smtClean="0">
+                <a:solidFill>
+                  <a:srgbClr val="070BB9"/>
+                </a:solidFill>
+              </a:rPr>
+              <a:t> </a:t>
+            </a:r>
+            <a:r>
+              <a:rPr lang="en-US" dirty="0" smtClean="0"/>
+              <a:t>– A Java-based LL(*) parser that parses a structured corpus based off a user-defined grammar.  </a:t>
+            </a:r>
+            <a:r>
               <a:rPr lang="en-US" i="1" dirty="0" err="1" smtClean="0"/>
               <a:t>HamSkill</a:t>
             </a:r>
             <a:r>
               <a:rPr lang="en-US" dirty="0" smtClean="0"/>
-              <a:t> Software Architecture</a:t>
-            </a:r>
+              <a:t> uses two separate grammars, namely:</a:t>
+            </a:r>
+          </a:p>
+          <a:p>
+            <a:pPr lvl="1">
+              <a:lnSpc>
+                <a:spcPct val="140000"/>
+              </a:lnSpc>
+            </a:pPr>
+            <a:r>
+              <a:rPr lang="en-US" b="1" dirty="0" smtClean="0">
+                <a:solidFill>
+                  <a:srgbClr val="008000"/>
+                </a:solidFill>
+                <a:latin typeface="Courier New" panose="02070309020205020404" pitchFamily="49" charset="0"/>
+                <a:cs typeface="Courier New" panose="02070309020205020404" pitchFamily="49" charset="0"/>
+              </a:rPr>
+              <a:t>Haskell.g4</a:t>
+            </a:r>
+            <a:r>
+              <a:rPr lang="en-US" b="1" dirty="0" smtClean="0">
+                <a:solidFill>
+                  <a:srgbClr val="008000"/>
+                </a:solidFill>
+              </a:rPr>
+              <a:t> </a:t>
+            </a:r>
+            <a:r>
+              <a:rPr lang="en-US" dirty="0" smtClean="0"/>
+              <a:t>– Defines how to parse Haskell code</a:t>
+            </a:r>
+          </a:p>
+          <a:p>
+            <a:pPr lvl="1">
+              <a:lnSpc>
+                <a:spcPct val="140000"/>
+              </a:lnSpc>
+            </a:pPr>
+            <a:r>
+              <a:rPr lang="en-US" b="1" dirty="0">
+                <a:solidFill>
+                  <a:srgbClr val="008000"/>
+                </a:solidFill>
+                <a:latin typeface="Courier New" panose="02070309020205020404" pitchFamily="49" charset="0"/>
+                <a:cs typeface="Courier New" panose="02070309020205020404" pitchFamily="49" charset="0"/>
+              </a:rPr>
+              <a:t>ScalaOutput.g4</a:t>
+            </a:r>
+            <a:r>
+              <a:rPr lang="en-US" dirty="0" smtClean="0"/>
+              <a:t> – Defines how to reformat </a:t>
+            </a:r>
+            <a:r>
+              <a:rPr lang="en-US" i="1" dirty="0" err="1" smtClean="0"/>
+              <a:t>HamSkill</a:t>
+            </a:r>
+            <a:r>
+              <a:rPr lang="en-US" dirty="0" err="1" smtClean="0"/>
+              <a:t>’s</a:t>
+            </a:r>
+            <a:r>
+              <a:rPr lang="en-US" dirty="0" smtClean="0"/>
+              <a:t> default output to match Haskell’s standard output</a:t>
+            </a:r>
+          </a:p>
+          <a:p>
+            <a:pPr>
+              <a:lnSpc>
+                <a:spcPct val="140000"/>
+              </a:lnSpc>
+            </a:pPr>
+            <a:endParaRPr lang="en-US" sz="1900" dirty="0"/>
+          </a:p>
+          <a:p>
+            <a:pPr>
+              <a:lnSpc>
+                <a:spcPct val="140000"/>
+              </a:lnSpc>
+            </a:pPr>
+            <a:r>
+              <a:rPr lang="en-US" b="1" dirty="0" err="1" smtClean="0">
+                <a:solidFill>
+                  <a:srgbClr val="070BB9"/>
+                </a:solidFill>
+                <a:latin typeface="Courier New" panose="02070309020205020404" pitchFamily="49" charset="0"/>
+                <a:cs typeface="Courier New" panose="02070309020205020404" pitchFamily="49" charset="0"/>
+              </a:rPr>
+              <a:t>HamskillMain</a:t>
+            </a:r>
+            <a:r>
+              <a:rPr lang="en-US" dirty="0" smtClean="0"/>
+              <a:t> – Java class that extends an ANTLR listener class to </a:t>
+            </a:r>
+            <a:r>
+              <a:rPr lang="en-US" dirty="0" err="1" smtClean="0"/>
+              <a:t>transpile</a:t>
+            </a:r>
+            <a:r>
+              <a:rPr lang="en-US" dirty="0" smtClean="0"/>
+              <a:t> Haskell code to Scala.</a:t>
+            </a:r>
+          </a:p>
+          <a:p>
+            <a:pPr>
+              <a:lnSpc>
+                <a:spcPct val="140000"/>
+              </a:lnSpc>
+            </a:pPr>
+            <a:endParaRPr lang="en-US" sz="1900" dirty="0"/>
+          </a:p>
+          <a:p>
+            <a:pPr>
+              <a:lnSpc>
+                <a:spcPct val="140000"/>
+              </a:lnSpc>
+            </a:pPr>
+            <a:r>
+              <a:rPr lang="en-US" b="1" dirty="0" smtClean="0">
+                <a:solidFill>
+                  <a:srgbClr val="070BB9"/>
+                </a:solidFill>
+              </a:rPr>
+              <a:t>Scala </a:t>
+            </a:r>
+            <a:r>
+              <a:rPr lang="en-US" dirty="0" smtClean="0"/>
+              <a:t>– JVM-based, functional programming language whose feature set overlaps well with Haskell.</a:t>
+            </a:r>
+          </a:p>
+          <a:p>
+            <a:pPr>
+              <a:lnSpc>
+                <a:spcPct val="140000"/>
+              </a:lnSpc>
+            </a:pPr>
+            <a:endParaRPr lang="en-US" sz="1900" dirty="0"/>
+          </a:p>
+          <a:p>
+            <a:pPr>
+              <a:lnSpc>
+                <a:spcPct val="140000"/>
+              </a:lnSpc>
+            </a:pPr>
+            <a:r>
+              <a:rPr lang="en-US" b="1" dirty="0" err="1" smtClean="0">
+                <a:solidFill>
+                  <a:srgbClr val="070BB9"/>
+                </a:solidFill>
+                <a:latin typeface="Courier New" panose="02070309020205020404" pitchFamily="49" charset="0"/>
+                <a:cs typeface="Courier New" panose="02070309020205020404" pitchFamily="49" charset="0"/>
+              </a:rPr>
+              <a:t>ScalaOutput</a:t>
+            </a:r>
+            <a:r>
+              <a:rPr lang="en-US" dirty="0" smtClean="0"/>
+              <a:t> </a:t>
+            </a:r>
+            <a:r>
+              <a:rPr lang="en-US" dirty="0"/>
+              <a:t>– </a:t>
+            </a:r>
+            <a:r>
+              <a:rPr lang="en-US" dirty="0" smtClean="0"/>
+              <a:t>Java class that extends an ANTLR listener class to format the output from Scala to match the formatting of Haskell.</a:t>
+            </a:r>
+            <a:endParaRPr lang="en-US" dirty="0"/>
+          </a:p>
+          <a:p>
+            <a:pPr>
+              <a:lnSpc>
+                <a:spcPct val="140000"/>
+              </a:lnSpc>
+            </a:pPr>
+            <a:endParaRPr lang="en-US" dirty="0" smtClean="0"/>
+          </a:p>
+          <a:p>
+            <a:pPr lvl="1">
+              <a:lnSpc>
+                <a:spcPct val="140000"/>
+              </a:lnSpc>
+            </a:pPr>
+            <a:endParaRPr lang="en-US" dirty="0" smtClean="0"/>
+          </a:p>
+          <a:p>
+            <a:pPr>
+              <a:lnSpc>
+                <a:spcPct val="140000"/>
+              </a:lnSpc>
+            </a:pPr>
             <a:endParaRPr lang="en-US" dirty="0"/>
           </a:p>
         </p:txBody>
@@ -4269,6 +4544,101 @@
                 <a:defRPr/>
               </a:pPr>
               <a:t>4</a:t>
+            </a:fld>
+            <a:endParaRPr lang="en-US"/>
+          </a:p>
+        </p:txBody>
+      </p:sp>
+    </p:spTree>
+    <p:extLst>
+      <p:ext uri="{BB962C8B-B14F-4D97-AF65-F5344CB8AC3E}">
+        <p14:creationId xmlns:p14="http://schemas.microsoft.com/office/powerpoint/2010/main" val="3434304703"/>
+      </p:ext>
+    </p:extLst>
+  </p:cSld>
+  <p:clrMapOvr>
+    <a:masterClrMapping/>
+  </p:clrMapOvr>
+  <p:timing>
+    <p:tnLst>
+      <p:par>
+        <p:cTn id="1" dur="indefinite" restart="never" nodeType="tmRoot"/>
+      </p:par>
+    </p:tnLst>
+  </p:timing>
+</p:sld>
+</file>
+
+<file path=ppt/slides/slide5.xml><?xml version="1.0" encoding="utf-8"?>
+<p:sld xmlns:a="http://schemas.openxmlformats.org/drawingml/2006/main" xmlns:r="http://schemas.openxmlformats.org/officeDocument/2006/relationships" xmlns:p="http://schemas.openxmlformats.org/presentationml/2006/main">
+  <p:cSld>
+    <p:spTree>
+      <p:nvGrpSpPr>
+        <p:cNvPr id="1" name=""/>
+        <p:cNvGrpSpPr/>
+        <p:nvPr/>
+      </p:nvGrpSpPr>
+      <p:grpSpPr>
+        <a:xfrm>
+          <a:off x="0" y="0"/>
+          <a:ext cx="0" cy="0"/>
+          <a:chOff x="0" y="0"/>
+          <a:chExt cx="0" cy="0"/>
+        </a:xfrm>
+      </p:grpSpPr>
+      <p:sp>
+        <p:nvSpPr>
+          <p:cNvPr id="2" name="Title 1"/>
+          <p:cNvSpPr>
+            <a:spLocks noGrp="1"/>
+          </p:cNvSpPr>
+          <p:nvPr>
+            <p:ph type="title"/>
+          </p:nvPr>
+        </p:nvSpPr>
+        <p:spPr/>
+        <p:txBody>
+          <a:bodyPr>
+            <a:noAutofit/>
+          </a:bodyPr>
+          <a:lstStyle/>
+          <a:p>
+            <a:r>
+              <a:rPr lang="en-US" i="1" dirty="0" err="1" smtClean="0"/>
+              <a:t>HamSkill</a:t>
+            </a:r>
+            <a:r>
+              <a:rPr lang="en-US" dirty="0" smtClean="0"/>
+              <a:t> Software Architecture</a:t>
+            </a:r>
+            <a:endParaRPr lang="en-US" dirty="0"/>
+          </a:p>
+        </p:txBody>
+      </p:sp>
+      <p:sp>
+        <p:nvSpPr>
+          <p:cNvPr id="4" name="Slide Number Placeholder 3"/>
+          <p:cNvSpPr>
+            <a:spLocks noGrp="1"/>
+          </p:cNvSpPr>
+          <p:nvPr>
+            <p:ph type="sldNum" sz="quarter" idx="11"/>
+          </p:nvPr>
+        </p:nvSpPr>
+        <p:spPr/>
+        <p:txBody>
+          <a:bodyPr/>
+          <a:lstStyle/>
+          <a:p>
+            <a:pPr>
+              <a:defRPr/>
+            </a:pPr>
+            <a:fld id="{325C3FDD-057D-474A-9872-6BB25CD8D5F2}" type="slidenum">
+              <a:rPr lang="en-US" smtClean="0"/>
+              <a:pPr>
+                <a:defRPr/>
+              </a:pPr>
+              <a:t>5</a:t>
             </a:fld>
             <a:endParaRPr lang="en-US"/>
           </a:p>
@@ -4350,351 +4720,6 @@
 </p:sld>
 </file>
 
-<file path=ppt/slides/slide5.xml><?xml version="1.0" encoding="utf-8"?>
-<p:sld xmlns:a="http://schemas.openxmlformats.org/drawingml/2006/main" xmlns:r="http://schemas.openxmlformats.org/officeDocument/2006/relationships" xmlns:p="http://schemas.openxmlformats.org/presentationml/2006/main">
-  <p:cSld>
-    <p:spTree>
-      <p:nvGrpSpPr>
-        <p:cNvPr id="1" name=""/>
-        <p:cNvGrpSpPr/>
-        <p:nvPr/>
-      </p:nvGrpSpPr>
-      <p:grpSpPr>
-        <a:xfrm>
-          <a:off x="0" y="0"/>
-          <a:ext cx="0" cy="0"/>
-          <a:chOff x="0" y="0"/>
-          <a:chExt cx="0" cy="0"/>
-        </a:xfrm>
-      </p:grpSpPr>
-      <p:sp>
-        <p:nvSpPr>
-          <p:cNvPr id="2" name="Title 1"/>
-          <p:cNvSpPr>
-            <a:spLocks noGrp="1"/>
-          </p:cNvSpPr>
-          <p:nvPr>
-            <p:ph type="title"/>
-          </p:nvPr>
-        </p:nvSpPr>
-        <p:spPr/>
-        <p:txBody>
-          <a:bodyPr>
-            <a:noAutofit/>
-          </a:bodyPr>
-          <a:lstStyle/>
-          <a:p>
-            <a:r>
-              <a:rPr lang="en-US" sz="3000" dirty="0" smtClean="0"/>
-              <a:t>Key </a:t>
-            </a:r>
-            <a:r>
-              <a:rPr lang="en-US" sz="3000" i="1" dirty="0" err="1" smtClean="0"/>
-              <a:t>HamSkill</a:t>
-            </a:r>
-            <a:r>
-              <a:rPr lang="en-US" sz="3000" dirty="0" smtClean="0"/>
-              <a:t> Architecture Components</a:t>
-            </a:r>
-            <a:endParaRPr lang="en-US" sz="3000" dirty="0"/>
-          </a:p>
-        </p:txBody>
-      </p:sp>
-      <p:sp>
-        <p:nvSpPr>
-          <p:cNvPr id="3" name="Content Placeholder 2"/>
-          <p:cNvSpPr>
-            <a:spLocks noGrp="1"/>
-          </p:cNvSpPr>
-          <p:nvPr>
-            <p:ph idx="1"/>
-          </p:nvPr>
-        </p:nvSpPr>
-        <p:spPr>
-          <a:xfrm>
-            <a:off x="457200" y="989012"/>
-            <a:ext cx="8229600" cy="5267007"/>
-          </a:xfrm>
-        </p:spPr>
-        <p:txBody>
-          <a:bodyPr>
-            <a:normAutofit fontScale="77500" lnSpcReduction="20000"/>
-          </a:bodyPr>
-          <a:lstStyle/>
-          <a:p>
-            <a:pPr>
-              <a:lnSpc>
-                <a:spcPct val="140000"/>
-              </a:lnSpc>
-            </a:pPr>
-            <a:r>
-              <a:rPr lang="en-US" b="1" dirty="0" smtClean="0">
-                <a:solidFill>
-                  <a:srgbClr val="070BB9"/>
-                </a:solidFill>
-              </a:rPr>
-              <a:t>ANTLR</a:t>
-            </a:r>
-            <a:r>
-              <a:rPr lang="en-US" dirty="0" smtClean="0">
-                <a:solidFill>
-                  <a:srgbClr val="070BB9"/>
-                </a:solidFill>
-              </a:rPr>
-              <a:t> </a:t>
-            </a:r>
-            <a:r>
-              <a:rPr lang="en-US" dirty="0" smtClean="0"/>
-              <a:t>– A Java-based LL(*) parser that parses a structured corpus based off a user-defined grammar.  </a:t>
-            </a:r>
-            <a:r>
-              <a:rPr lang="en-US" i="1" dirty="0" err="1" smtClean="0"/>
-              <a:t>HamSkill</a:t>
-            </a:r>
-            <a:r>
-              <a:rPr lang="en-US" dirty="0" smtClean="0"/>
-              <a:t> uses two separate grammars, namely:</a:t>
-            </a:r>
-          </a:p>
-          <a:p>
-            <a:pPr lvl="1">
-              <a:lnSpc>
-                <a:spcPct val="140000"/>
-              </a:lnSpc>
-            </a:pPr>
-            <a:r>
-              <a:rPr lang="en-US" b="1" dirty="0" smtClean="0">
-                <a:solidFill>
-                  <a:srgbClr val="008000"/>
-                </a:solidFill>
-                <a:latin typeface="Courier New" panose="02070309020205020404" pitchFamily="49" charset="0"/>
-                <a:cs typeface="Courier New" panose="02070309020205020404" pitchFamily="49" charset="0"/>
-              </a:rPr>
-              <a:t>Haskell.g4</a:t>
-            </a:r>
-            <a:r>
-              <a:rPr lang="en-US" b="1" dirty="0" smtClean="0">
-                <a:solidFill>
-                  <a:srgbClr val="008000"/>
-                </a:solidFill>
-              </a:rPr>
-              <a:t> </a:t>
-            </a:r>
-            <a:r>
-              <a:rPr lang="en-US" dirty="0" smtClean="0"/>
-              <a:t>– Defines how to parse Haskell code</a:t>
-            </a:r>
-          </a:p>
-          <a:p>
-            <a:pPr lvl="1">
-              <a:lnSpc>
-                <a:spcPct val="140000"/>
-              </a:lnSpc>
-            </a:pPr>
-            <a:r>
-              <a:rPr lang="en-US" b="1" dirty="0">
-                <a:solidFill>
-                  <a:srgbClr val="008000"/>
-                </a:solidFill>
-                <a:latin typeface="Courier New" panose="02070309020205020404" pitchFamily="49" charset="0"/>
-                <a:cs typeface="Courier New" panose="02070309020205020404" pitchFamily="49" charset="0"/>
-              </a:rPr>
-              <a:t>ScalaOutput.g4</a:t>
-            </a:r>
-            <a:r>
-              <a:rPr lang="en-US" dirty="0" smtClean="0"/>
-              <a:t> – Defines how to reformat </a:t>
-            </a:r>
-            <a:r>
-              <a:rPr lang="en-US" i="1" dirty="0" err="1" smtClean="0"/>
-              <a:t>HamSkill</a:t>
-            </a:r>
-            <a:r>
-              <a:rPr lang="en-US" dirty="0" err="1" smtClean="0"/>
-              <a:t>’s</a:t>
-            </a:r>
-            <a:r>
-              <a:rPr lang="en-US" dirty="0" smtClean="0"/>
-              <a:t> default output to match Haskell’s standard output</a:t>
-            </a:r>
-          </a:p>
-          <a:p>
-            <a:pPr>
-              <a:lnSpc>
-                <a:spcPct val="140000"/>
-              </a:lnSpc>
-            </a:pPr>
-            <a:endParaRPr lang="en-US" sz="1900" dirty="0"/>
-          </a:p>
-          <a:p>
-            <a:pPr>
-              <a:lnSpc>
-                <a:spcPct val="140000"/>
-              </a:lnSpc>
-            </a:pPr>
-            <a:r>
-              <a:rPr lang="en-US" b="1" dirty="0" err="1" smtClean="0">
-                <a:solidFill>
-                  <a:srgbClr val="070BB9"/>
-                </a:solidFill>
-                <a:latin typeface="Courier New" panose="02070309020205020404" pitchFamily="49" charset="0"/>
-                <a:cs typeface="Courier New" panose="02070309020205020404" pitchFamily="49" charset="0"/>
-              </a:rPr>
-              <a:t>HamskillMain</a:t>
-            </a:r>
-            <a:r>
-              <a:rPr lang="en-US" dirty="0" smtClean="0"/>
-              <a:t> – Java class that extends an ANTLR listener class to </a:t>
-            </a:r>
-            <a:r>
-              <a:rPr lang="en-US" dirty="0" err="1" smtClean="0"/>
-              <a:t>transpile</a:t>
-            </a:r>
-            <a:r>
-              <a:rPr lang="en-US" dirty="0" smtClean="0"/>
-              <a:t> Haskell code to Scala.</a:t>
-            </a:r>
-          </a:p>
-          <a:p>
-            <a:pPr>
-              <a:lnSpc>
-                <a:spcPct val="140000"/>
-              </a:lnSpc>
-            </a:pPr>
-            <a:endParaRPr lang="en-US" sz="1900" dirty="0"/>
-          </a:p>
-          <a:p>
-            <a:pPr>
-              <a:lnSpc>
-                <a:spcPct val="140000"/>
-              </a:lnSpc>
-            </a:pPr>
-            <a:r>
-              <a:rPr lang="en-US" b="1" dirty="0" smtClean="0">
-                <a:solidFill>
-                  <a:srgbClr val="070BB9"/>
-                </a:solidFill>
-              </a:rPr>
-              <a:t>Scala </a:t>
-            </a:r>
-            <a:r>
-              <a:rPr lang="en-US" dirty="0" smtClean="0"/>
-              <a:t>– JVM-based, functional programming language whose feature set overlaps well with Haskell.</a:t>
-            </a:r>
-          </a:p>
-          <a:p>
-            <a:pPr>
-              <a:lnSpc>
-                <a:spcPct val="140000"/>
-              </a:lnSpc>
-            </a:pPr>
-            <a:endParaRPr lang="en-US" sz="1900" dirty="0"/>
-          </a:p>
-          <a:p>
-            <a:pPr>
-              <a:lnSpc>
-                <a:spcPct val="140000"/>
-              </a:lnSpc>
-            </a:pPr>
-            <a:r>
-              <a:rPr lang="en-US" b="1" dirty="0" err="1" smtClean="0">
-                <a:solidFill>
-                  <a:srgbClr val="070BB9"/>
-                </a:solidFill>
-                <a:latin typeface="Courier New" panose="02070309020205020404" pitchFamily="49" charset="0"/>
-                <a:cs typeface="Courier New" panose="02070309020205020404" pitchFamily="49" charset="0"/>
-              </a:rPr>
-              <a:t>ScalaOutput</a:t>
-            </a:r>
-            <a:r>
-              <a:rPr lang="en-US" dirty="0" smtClean="0"/>
-              <a:t> </a:t>
-            </a:r>
-            <a:r>
-              <a:rPr lang="en-US" dirty="0"/>
-              <a:t>– </a:t>
-            </a:r>
-            <a:r>
-              <a:rPr lang="en-US" dirty="0" smtClean="0"/>
-              <a:t>Java class that extends an ANTLR listener class to format the output from Scala to match the formatting of Haskell.</a:t>
-            </a:r>
-            <a:endParaRPr lang="en-US" dirty="0"/>
-          </a:p>
-          <a:p>
-            <a:pPr>
-              <a:lnSpc>
-                <a:spcPct val="140000"/>
-              </a:lnSpc>
-            </a:pPr>
-            <a:endParaRPr lang="en-US" dirty="0" smtClean="0"/>
-          </a:p>
-          <a:p>
-            <a:pPr lvl="1">
-              <a:lnSpc>
-                <a:spcPct val="140000"/>
-              </a:lnSpc>
-            </a:pPr>
-            <a:endParaRPr lang="en-US" dirty="0" smtClean="0"/>
-          </a:p>
-          <a:p>
-            <a:pPr>
-              <a:lnSpc>
-                <a:spcPct val="140000"/>
-              </a:lnSpc>
-            </a:pPr>
-            <a:endParaRPr lang="en-US" dirty="0"/>
-          </a:p>
-        </p:txBody>
-      </p:sp>
-      <p:sp>
-        <p:nvSpPr>
-          <p:cNvPr id="4" name="Slide Number Placeholder 3"/>
-          <p:cNvSpPr>
-            <a:spLocks noGrp="1"/>
-          </p:cNvSpPr>
-          <p:nvPr>
-            <p:ph type="sldNum" sz="quarter" idx="11"/>
-          </p:nvPr>
-        </p:nvSpPr>
-        <p:spPr/>
-        <p:txBody>
-          <a:bodyPr/>
-          <a:lstStyle/>
-          <a:p>
-            <a:pPr>
-              <a:defRPr/>
-            </a:pPr>
-            <a:fld id="{325C3FDD-057D-474A-9872-6BB25CD8D5F2}" type="slidenum">
-              <a:rPr lang="en-US" smtClean="0"/>
-              <a:pPr>
-                <a:defRPr/>
-              </a:pPr>
-              <a:t>5</a:t>
-            </a:fld>
-            <a:endParaRPr lang="en-US"/>
-          </a:p>
-        </p:txBody>
-      </p:sp>
-    </p:spTree>
-    <p:extLst>
-      <p:ext uri="{BB962C8B-B14F-4D97-AF65-F5344CB8AC3E}">
-        <p14:creationId xmlns:p14="http://schemas.microsoft.com/office/powerpoint/2010/main" val="3434304703"/>
-      </p:ext>
-    </p:extLst>
-  </p:cSld>
-  <p:clrMapOvr>
-    <a:masterClrMapping/>
-  </p:clrMapOvr>
-  <p:timing>
-    <p:tnLst>
-      <p:par>
-        <p:cTn id="1" dur="indefinite" restart="never" nodeType="tmRoot"/>
-      </p:par>
-    </p:tnLst>
-  </p:timing>
-</p:sld>
-</file>
-
 <file path=ppt/slides/slide6.xml><?xml version="1.0" encoding="utf-8"?>
 <p:sld xmlns:a="http://schemas.openxmlformats.org/drawingml/2006/main" xmlns:r="http://schemas.openxmlformats.org/officeDocument/2006/relationships" xmlns:p="http://schemas.openxmlformats.org/presentationml/2006/main">
   <p:cSld>
@@ -4780,8 +4805,38 @@
                 <a:latin typeface="Palatino Linotype" pitchFamily="18" charset="0"/>
                 <a:cs typeface="Times New Roman" pitchFamily="18" charset="0"/>
               </a:rPr>
-              <a:t>Testing and Future Improvements</a:t>
-            </a:r>
+              <a:t>One Good Decision </a:t>
+            </a:r>
+          </a:p>
+          <a:p>
+            <a:pPr algn="ctr"/>
+            <a:r>
+              <a:rPr lang="en-US" sz="4400" dirty="0" smtClean="0">
+                <a:solidFill>
+                  <a:srgbClr val="0165BF"/>
+                </a:solidFill>
+                <a:latin typeface="Palatino Linotype" pitchFamily="18" charset="0"/>
+                <a:cs typeface="Times New Roman" pitchFamily="18" charset="0"/>
+              </a:rPr>
+              <a:t>and One Bad </a:t>
+            </a:r>
+            <a:r>
+              <a:rPr lang="en-US" sz="4400" dirty="0" err="1" smtClean="0">
+                <a:solidFill>
+                  <a:srgbClr val="0165BF"/>
+                </a:solidFill>
+                <a:latin typeface="Palatino Linotype" pitchFamily="18" charset="0"/>
+                <a:cs typeface="Times New Roman" pitchFamily="18" charset="0"/>
+              </a:rPr>
+              <a:t>Decisin</a:t>
+            </a:r>
+            <a:endParaRPr lang="en-US" sz="4400" dirty="0" smtClean="0">
+              <a:solidFill>
+                <a:srgbClr val="0165BF"/>
+              </a:solidFill>
+              <a:latin typeface="Palatino Linotype" pitchFamily="18" charset="0"/>
+              <a:cs typeface="Times New Roman" pitchFamily="18" charset="0"/>
+            </a:endParaRPr>
           </a:p>
         </p:txBody>
       </p:sp>
@@ -4889,13 +4944,16 @@
                   <a:srgbClr val="008000"/>
                 </a:solidFill>
               </a:rPr>
-              <a:t>the Original Decision may be Better </a:t>
-            </a:r>
-            <a:endParaRPr lang="en-US" b="1" dirty="0" smtClean="0">
-              <a:solidFill>
-                <a:srgbClr val="008000"/>
-              </a:solidFill>
-            </a:endParaRPr>
+              <a:t>the </a:t>
+            </a:r>
+            <a:r>
+              <a:rPr lang="en-US" b="1" dirty="0" smtClean="0">
+                <a:solidFill>
+                  <a:srgbClr val="008000"/>
+                </a:solidFill>
+              </a:rPr>
+              <a:t>Decision was Good</a:t>
+            </a:r>
           </a:p>
           <a:p>
             <a:pPr lvl="1">
@@ -4949,7 +5007,7 @@
             </a:pPr>
             <a:r>
               <a:rPr lang="en-US" dirty="0" smtClean="0"/>
-              <a:t>Expanding the grammar is fast</a:t>
+              <a:t>Grammars can be quickly extended</a:t>
             </a:r>
             <a:endParaRPr lang="en-US" dirty="0" smtClean="0"/>
           </a:p>
@@ -4959,7 +5017,7 @@
                 <a:spcPct val="140000"/>
               </a:lnSpc>
             </a:pPr>
-            <a:endParaRPr lang="en-US" sz="1900" dirty="0"/>
+            <a:endParaRPr lang="en-US" sz="1100" dirty="0"/>
           </a:p>
           <a:p>
             <a:pPr>
@@ -4967,21 +5025,13 @@
                 <a:spcPct val="140000"/>
               </a:lnSpc>
             </a:pPr>
-            <a:r>
-              <a:rPr lang="en-US" b="1" dirty="0">
-                <a:solidFill>
-                  <a:srgbClr val="C00000"/>
-                </a:solidFill>
-              </a:rPr>
-              <a:t>Why the Original Decision </a:t>
-            </a:r>
             <a:r>
               <a:rPr lang="en-US" b="1" dirty="0" smtClean="0">
                 <a:solidFill>
                   <a:srgbClr val="C00000"/>
                 </a:solidFill>
               </a:rPr>
-              <a:t>may be Poor</a:t>
+              <a:t>Reasons why the Decision may be Poor</a:t>
             </a:r>
             <a:endParaRPr lang="en-US" b="1" dirty="0" smtClean="0">
               <a:solidFill>
@@ -5166,7 +5216,7 @@
                   <a:srgbClr val="C00000"/>
                 </a:solidFill>
               </a:rPr>
-              <a:t>Why the Original Decision is Poor</a:t>
+              <a:t>Why the Decision is Poor</a:t>
             </a:r>
           </a:p>
           <a:p>
@@ -5223,7 +5273,7 @@
                   <a:srgbClr val="008000"/>
                 </a:solidFill>
               </a:rPr>
-              <a:t>Why the Original Decision may be Better</a:t>
+              <a:t>Reasons why the Decision may be Good</a:t>
             </a:r>
           </a:p>
           <a:p>

</xml_diff>